<commit_message>
Change the note and presentation
</commit_message>
<xml_diff>
--- a/Презентация и записка/Презентация.pptx
+++ b/Презентация и записка/Презентация.pptx
@@ -218,7 +218,7 @@
           <a:effectLst/>
           <a:extLst>
             <a:ext uri="{91240B29-F687-4f45-9708-019B960494DF}">
-              <a14:hiddenLine xmlns:a14="http://schemas.microsoft.com/office/drawing/2010/main" xmlns="" w="9525">
+              <a14:hiddenLine xmlns="" xmlns:a14="http://schemas.microsoft.com/office/drawing/2010/main" w="9525">
                 <a:solidFill>
                   <a:srgbClr val="000000"/>
                 </a:solidFill>
@@ -410,7 +410,7 @@
           <a:p>
             <a:fld id="{D7F0A478-1AE4-42D6-B0D1-A0397DB76C21}" type="datetimeFigureOut">
               <a:rPr lang="ru-RU" smtClean="0"/>
-              <a:t>30.05.2021</a:t>
+              <a:t>31.05.2021</a:t>
             </a:fld>
             <a:endParaRPr lang="ru-RU"/>
           </a:p>
@@ -728,7 +728,7 @@
           <a:p>
             <a:fld id="{D7F0A478-1AE4-42D6-B0D1-A0397DB76C21}" type="datetimeFigureOut">
               <a:rPr lang="ru-RU" smtClean="0"/>
-              <a:t>30.05.2021</a:t>
+              <a:t>31.05.2021</a:t>
             </a:fld>
             <a:endParaRPr lang="ru-RU"/>
           </a:p>
@@ -1216,7 +1216,7 @@
           <a:p>
             <a:fld id="{D7F0A478-1AE4-42D6-B0D1-A0397DB76C21}" type="datetimeFigureOut">
               <a:rPr lang="ru-RU" smtClean="0"/>
-              <a:t>30.05.2021</a:t>
+              <a:t>31.05.2021</a:t>
             </a:fld>
             <a:endParaRPr lang="ru-RU"/>
           </a:p>
@@ -1585,7 +1585,7 @@
           <a:p>
             <a:fld id="{D7F0A478-1AE4-42D6-B0D1-A0397DB76C21}" type="datetimeFigureOut">
               <a:rPr lang="ru-RU" smtClean="0"/>
-              <a:t>30.05.2021</a:t>
+              <a:t>31.05.2021</a:t>
             </a:fld>
             <a:endParaRPr lang="ru-RU"/>
           </a:p>
@@ -1740,7 +1740,7 @@
           <a:ln/>
           <a:extLst>
             <a:ext uri="{91240B29-F687-4f45-9708-019B960494DF}">
-              <a14:hiddenLine xmlns:a14="http://schemas.microsoft.com/office/drawing/2010/main" xmlns="" w="9525">
+              <a14:hiddenLine xmlns="" xmlns:a14="http://schemas.microsoft.com/office/drawing/2010/main" w="9525">
                 <a:solidFill>
                   <a:srgbClr val="000000"/>
                 </a:solidFill>
@@ -1858,7 +1858,7 @@
           <a:p>
             <a:fld id="{D7F0A478-1AE4-42D6-B0D1-A0397DB76C21}" type="datetimeFigureOut">
               <a:rPr lang="ru-RU" smtClean="0"/>
-              <a:t>30.05.2021</a:t>
+              <a:t>31.05.2021</a:t>
             </a:fld>
             <a:endParaRPr lang="ru-RU"/>
           </a:p>
@@ -2015,7 +2015,7 @@
           <a:ln/>
           <a:extLst>
             <a:ext uri="{91240B29-F687-4f45-9708-019B960494DF}">
-              <a14:hiddenLine xmlns:a14="http://schemas.microsoft.com/office/drawing/2010/main" xmlns="" w="9525">
+              <a14:hiddenLine xmlns="" xmlns:a14="http://schemas.microsoft.com/office/drawing/2010/main" w="9525">
                 <a:solidFill>
                   <a:srgbClr val="000000"/>
                 </a:solidFill>
@@ -2143,7 +2143,7 @@
           <a:p>
             <a:fld id="{D7F0A478-1AE4-42D6-B0D1-A0397DB76C21}" type="datetimeFigureOut">
               <a:rPr lang="ru-RU" smtClean="0"/>
-              <a:t>30.05.2021</a:t>
+              <a:t>31.05.2021</a:t>
             </a:fld>
             <a:endParaRPr lang="ru-RU"/>
           </a:p>
@@ -2298,7 +2298,7 @@
           <a:ln/>
           <a:extLst>
             <a:ext uri="{91240B29-F687-4f45-9708-019B960494DF}">
-              <a14:hiddenLine xmlns:a14="http://schemas.microsoft.com/office/drawing/2010/main" xmlns="" w="9525">
+              <a14:hiddenLine xmlns="" xmlns:a14="http://schemas.microsoft.com/office/drawing/2010/main" w="9525">
                 <a:solidFill>
                   <a:srgbClr val="000000"/>
                 </a:solidFill>
@@ -2426,7 +2426,7 @@
           <a:p>
             <a:fld id="{D7F0A478-1AE4-42D6-B0D1-A0397DB76C21}" type="datetimeFigureOut">
               <a:rPr lang="ru-RU" smtClean="0"/>
-              <a:t>30.05.2021</a:t>
+              <a:t>31.05.2021</a:t>
             </a:fld>
             <a:endParaRPr lang="ru-RU"/>
           </a:p>
@@ -2769,7 +2769,7 @@
           <a:p>
             <a:fld id="{D7F0A478-1AE4-42D6-B0D1-A0397DB76C21}" type="datetimeFigureOut">
               <a:rPr lang="ru-RU" smtClean="0"/>
-              <a:t>30.05.2021</a:t>
+              <a:t>31.05.2021</a:t>
             </a:fld>
             <a:endParaRPr lang="ru-RU"/>
           </a:p>
@@ -2924,7 +2924,7 @@
           <a:ln/>
           <a:extLst>
             <a:ext uri="{91240B29-F687-4f45-9708-019B960494DF}">
-              <a14:hiddenLine xmlns:a14="http://schemas.microsoft.com/office/drawing/2010/main" xmlns="" w="9525">
+              <a14:hiddenLine xmlns="" xmlns:a14="http://schemas.microsoft.com/office/drawing/2010/main" w="9525">
                 <a:solidFill>
                   <a:srgbClr val="000000"/>
                 </a:solidFill>
@@ -3108,7 +3108,7 @@
           <a:p>
             <a:fld id="{D7F0A478-1AE4-42D6-B0D1-A0397DB76C21}" type="datetimeFigureOut">
               <a:rPr lang="ru-RU" smtClean="0"/>
-              <a:t>30.05.2021</a:t>
+              <a:t>31.05.2021</a:t>
             </a:fld>
             <a:endParaRPr lang="ru-RU"/>
           </a:p>
@@ -3263,7 +3263,7 @@
           <a:ln/>
           <a:extLst>
             <a:ext uri="{91240B29-F687-4f45-9708-019B960494DF}">
-              <a14:hiddenLine xmlns:a14="http://schemas.microsoft.com/office/drawing/2010/main" xmlns="" w="9525">
+              <a14:hiddenLine xmlns="" xmlns:a14="http://schemas.microsoft.com/office/drawing/2010/main" w="9525">
                 <a:solidFill>
                   <a:srgbClr val="000000"/>
                 </a:solidFill>
@@ -3585,7 +3585,7 @@
           <a:p>
             <a:fld id="{D7F0A478-1AE4-42D6-B0D1-A0397DB76C21}" type="datetimeFigureOut">
               <a:rPr lang="ru-RU" smtClean="0"/>
-              <a:t>30.05.2021</a:t>
+              <a:t>31.05.2021</a:t>
             </a:fld>
             <a:endParaRPr lang="ru-RU"/>
           </a:p>
@@ -3740,7 +3740,7 @@
           <a:ln/>
           <a:extLst>
             <a:ext uri="{91240B29-F687-4f45-9708-019B960494DF}">
-              <a14:hiddenLine xmlns:a14="http://schemas.microsoft.com/office/drawing/2010/main" xmlns="" w="9525">
+              <a14:hiddenLine xmlns="" xmlns:a14="http://schemas.microsoft.com/office/drawing/2010/main" w="9525">
                 <a:solidFill>
                   <a:srgbClr val="000000"/>
                 </a:solidFill>
@@ -3806,7 +3806,7 @@
           <a:p>
             <a:fld id="{D7F0A478-1AE4-42D6-B0D1-A0397DB76C21}" type="datetimeFigureOut">
               <a:rPr lang="ru-RU" smtClean="0"/>
-              <a:t>30.05.2021</a:t>
+              <a:t>31.05.2021</a:t>
             </a:fld>
             <a:endParaRPr lang="ru-RU"/>
           </a:p>
@@ -3901,7 +3901,7 @@
           <a:p>
             <a:fld id="{D7F0A478-1AE4-42D6-B0D1-A0397DB76C21}" type="datetimeFigureOut">
               <a:rPr lang="ru-RU" smtClean="0"/>
-              <a:t>30.05.2021</a:t>
+              <a:t>31.05.2021</a:t>
             </a:fld>
             <a:endParaRPr lang="ru-RU"/>
           </a:p>
@@ -4169,7 +4169,7 @@
           <a:ln/>
           <a:extLst>
             <a:ext uri="{91240B29-F687-4f45-9708-019B960494DF}">
-              <a14:hiddenLine xmlns:a14="http://schemas.microsoft.com/office/drawing/2010/main" xmlns="" w="9525">
+              <a14:hiddenLine xmlns="" xmlns:a14="http://schemas.microsoft.com/office/drawing/2010/main" w="9525">
                 <a:solidFill>
                   <a:srgbClr val="000000"/>
                 </a:solidFill>
@@ -4368,7 +4368,7 @@
           <a:p>
             <a:fld id="{D7F0A478-1AE4-42D6-B0D1-A0397DB76C21}" type="datetimeFigureOut">
               <a:rPr lang="ru-RU" smtClean="0"/>
-              <a:t>30.05.2021</a:t>
+              <a:t>31.05.2021</a:t>
             </a:fld>
             <a:endParaRPr lang="ru-RU"/>
           </a:p>
@@ -4681,7 +4681,7 @@
           <a:p>
             <a:fld id="{D7F0A478-1AE4-42D6-B0D1-A0397DB76C21}" type="datetimeFigureOut">
               <a:rPr lang="ru-RU" smtClean="0"/>
-              <a:t>30.05.2021</a:t>
+              <a:t>31.05.2021</a:t>
             </a:fld>
             <a:endParaRPr lang="ru-RU"/>
           </a:p>
@@ -4951,7 +4951,7 @@
           <a:p>
             <a:fld id="{D7F0A478-1AE4-42D6-B0D1-A0397DB76C21}" type="datetimeFigureOut">
               <a:rPr lang="ru-RU" smtClean="0"/>
-              <a:t>30.05.2021</a:t>
+              <a:t>31.05.2021</a:t>
             </a:fld>
             <a:endParaRPr lang="ru-RU"/>
           </a:p>
@@ -6371,7 +6371,7 @@
         </p:nvSpPr>
         <p:spPr>
           <a:xfrm>
-            <a:off x="818712" y="2222288"/>
+            <a:off x="810000" y="2146377"/>
             <a:ext cx="10563286" cy="1056622"/>
           </a:xfrm>
         </p:spPr>
@@ -6386,10 +6386,17 @@
               <a:t>Так же есть возможность прослушать перевод по кнопке. Для этого использовалась библиотека </a:t>
             </a:r>
             <a:r>
+              <a:rPr lang="en-US" sz="2000" dirty="0" err="1"/>
+              <a:t>gTTs</a:t>
+            </a:r>
+            <a:r>
               <a:rPr lang="en-US" sz="2000" dirty="0"/>
-              <a:t>pyttsx3</a:t>
-            </a:r>
-            <a:endParaRPr lang="ru-RU" sz="2000" dirty="0"/>
+              <a:t>. </a:t>
+            </a:r>
+            <a:r>
+              <a:rPr lang="ru-RU" sz="2000" dirty="0"/>
+              <a:t>Озвучивает максимум 100 символов – оптимально для слабого интернет-соединения.</a:t>
+            </a:r>
           </a:p>
         </p:txBody>
       </p:sp>
@@ -6415,7 +6422,7 @@
         </p:blipFill>
         <p:spPr>
           <a:xfrm>
-            <a:off x="3721488" y="3147581"/>
+            <a:off x="3721487" y="3202999"/>
             <a:ext cx="4749024" cy="3553399"/>
           </a:xfrm>
           <a:prstGeom prst="rect">

</xml_diff>